<commit_message>
fixed typos and added prompt example
</commit_message>
<xml_diff>
--- a/Q2_rProjectPresentation.pptx
+++ b/Q2_rProjectPresentation.pptx
@@ -7,15 +7,16 @@
   <p:sldIdLst>
     <p:sldId id="256" r:id="rId2"/>
     <p:sldId id="257" r:id="rId3"/>
-    <p:sldId id="258" r:id="rId4"/>
-    <p:sldId id="259" r:id="rId5"/>
-    <p:sldId id="265" r:id="rId6"/>
-    <p:sldId id="264" r:id="rId7"/>
-    <p:sldId id="260" r:id="rId8"/>
-    <p:sldId id="266" r:id="rId9"/>
-    <p:sldId id="261" r:id="rId10"/>
-    <p:sldId id="262" r:id="rId11"/>
-    <p:sldId id="263" r:id="rId12"/>
+    <p:sldId id="267" r:id="rId4"/>
+    <p:sldId id="258" r:id="rId5"/>
+    <p:sldId id="259" r:id="rId6"/>
+    <p:sldId id="265" r:id="rId7"/>
+    <p:sldId id="264" r:id="rId8"/>
+    <p:sldId id="260" r:id="rId9"/>
+    <p:sldId id="266" r:id="rId10"/>
+    <p:sldId id="261" r:id="rId11"/>
+    <p:sldId id="262" r:id="rId12"/>
+    <p:sldId id="263" r:id="rId13"/>
   </p:sldIdLst>
   <p:sldSz cx="12192000" cy="6858000"/>
   <p:notesSz cx="6858000" cy="9144000"/>
@@ -114,6 +115,11 @@
       </a:defRPr>
     </a:lvl9pPr>
   </p:defaultTextStyle>
+  <p:extLst>
+    <p:ext uri="{EFAFB233-063F-42B5-8137-9DF3F51BA10A}">
+      <p15:sldGuideLst xmlns:p15="http://schemas.microsoft.com/office/powerpoint/2012/main"/>
+    </p:ext>
+  </p:extLst>
 </p:presentation>
 </file>
 
@@ -13808,7 +13814,15 @@
           <a:p>
             <a:r>
               <a:rPr lang="en-US" dirty="0"/>
-              <a:t>Adam Walters, Ian Zheng, Henry Fong</a:t>
+              <a:t>Adam Walters, Ian </a:t>
+            </a:r>
+            <a:r>
+              <a:rPr lang="en-US" dirty="0" err="1"/>
+              <a:t>ZhAng</a:t>
+            </a:r>
+            <a:r>
+              <a:rPr lang="en-US" dirty="0"/>
+              <a:t>, Henry Fong</a:t>
             </a:r>
           </a:p>
         </p:txBody>
@@ -13848,6 +13862,110 @@
           <p:cNvPr id="2" name="Title 1">
             <a:extLst>
               <a:ext uri="{FF2B5EF4-FFF2-40B4-BE49-F238E27FC236}">
+                <a16:creationId xmlns:a16="http://schemas.microsoft.com/office/drawing/2014/main" id="{2D7460D1-0AC6-D5D6-4CA1-BFD25ED2AC61}"/>
+              </a:ext>
+            </a:extLst>
+          </p:cNvPr>
+          <p:cNvSpPr>
+            <a:spLocks noGrp="1"/>
+          </p:cNvSpPr>
+          <p:nvPr>
+            <p:ph type="title"/>
+          </p:nvPr>
+        </p:nvSpPr>
+        <p:spPr/>
+        <p:txBody>
+          <a:bodyPr/>
+          <a:lstStyle/>
+          <a:p>
+            <a:r>
+              <a:rPr lang="en-US" dirty="0"/>
+              <a:t>Insights and Conclusion</a:t>
+            </a:r>
+          </a:p>
+        </p:txBody>
+      </p:sp>
+      <p:sp>
+        <p:nvSpPr>
+          <p:cNvPr id="3" name="Content Placeholder 2">
+            <a:extLst>
+              <a:ext uri="{FF2B5EF4-FFF2-40B4-BE49-F238E27FC236}">
+                <a16:creationId xmlns:a16="http://schemas.microsoft.com/office/drawing/2014/main" id="{96EEA921-37BD-1493-0918-AF468B834E2B}"/>
+              </a:ext>
+            </a:extLst>
+          </p:cNvPr>
+          <p:cNvSpPr>
+            <a:spLocks noGrp="1"/>
+          </p:cNvSpPr>
+          <p:nvPr>
+            <p:ph idx="1"/>
+          </p:nvPr>
+        </p:nvSpPr>
+        <p:spPr/>
+        <p:txBody>
+          <a:bodyPr/>
+          <a:lstStyle/>
+          <a:p>
+            <a:r>
+              <a:rPr lang="en-US" dirty="0"/>
+              <a:t>ChatGPT has a positive view on the future of AI unless prompted to have a neutral or negative stance. </a:t>
+            </a:r>
+          </a:p>
+          <a:p>
+            <a:r>
+              <a:rPr lang="en-US" dirty="0"/>
+              <a:t>Only 1 word with a negative connotation was among the most relevant.</a:t>
+            </a:r>
+          </a:p>
+          <a:p>
+            <a:endParaRPr lang="en-US" dirty="0"/>
+          </a:p>
+          <a:p>
+            <a:r>
+              <a:rPr lang="en-US" dirty="0"/>
+              <a:t>ChatGPT addresses the ethics of AI, despite being one.</a:t>
+            </a:r>
+          </a:p>
+          <a:p>
+            <a:endParaRPr lang="en-US" dirty="0"/>
+          </a:p>
+        </p:txBody>
+      </p:sp>
+    </p:spTree>
+    <p:extLst>
+      <p:ext uri="{BB962C8B-B14F-4D97-AF65-F5344CB8AC3E}">
+        <p14:creationId xmlns:p14="http://schemas.microsoft.com/office/powerpoint/2010/main" val="693560995"/>
+      </p:ext>
+    </p:extLst>
+  </p:cSld>
+  <p:clrMapOvr>
+    <a:masterClrMapping/>
+  </p:clrMapOvr>
+</p:sld>
+</file>
+
+<file path=ppt/slides/slide11.xml><?xml version="1.0" encoding="utf-8"?>
+<p:sld xmlns:a="http://schemas.openxmlformats.org/drawingml/2006/main" xmlns:r="http://schemas.openxmlformats.org/officeDocument/2006/relationships" xmlns:p="http://schemas.openxmlformats.org/presentationml/2006/main">
+  <p:cSld>
+    <p:spTree>
+      <p:nvGrpSpPr>
+        <p:cNvPr id="1" name=""/>
+        <p:cNvGrpSpPr/>
+        <p:nvPr/>
+      </p:nvGrpSpPr>
+      <p:grpSpPr>
+        <a:xfrm>
+          <a:off x="0" y="0"/>
+          <a:ext cx="0" cy="0"/>
+          <a:chOff x="0" y="0"/>
+          <a:chExt cx="0" cy="0"/>
+        </a:xfrm>
+      </p:grpSpPr>
+      <p:sp>
+        <p:nvSpPr>
+          <p:cNvPr id="2" name="Title 1">
+            <a:extLst>
+              <a:ext uri="{FF2B5EF4-FFF2-40B4-BE49-F238E27FC236}">
                 <a16:creationId xmlns:a16="http://schemas.microsoft.com/office/drawing/2014/main" id="{3A1A322D-EEB6-3230-155F-B818CA998A22}"/>
               </a:ext>
             </a:extLst>
@@ -13933,7 +14051,7 @@
 </p:sld>
 </file>
 
-<file path=ppt/slides/slide11.xml><?xml version="1.0" encoding="utf-8"?>
+<file path=ppt/slides/slide12.xml><?xml version="1.0" encoding="utf-8"?>
 <p:sld xmlns:a="http://schemas.openxmlformats.org/drawingml/2006/main" xmlns:r="http://schemas.openxmlformats.org/officeDocument/2006/relationships" xmlns:p="http://schemas.openxmlformats.org/presentationml/2006/main">
   <p:cSld>
     <p:spTree>
@@ -14182,6 +14300,93 @@
           <p:cNvPr id="2" name="Title 1">
             <a:extLst>
               <a:ext uri="{FF2B5EF4-FFF2-40B4-BE49-F238E27FC236}">
+                <a16:creationId xmlns:a16="http://schemas.microsoft.com/office/drawing/2014/main" id="{E7DB9C1E-AFB3-FBE8-DA23-E14A210F0D66}"/>
+              </a:ext>
+            </a:extLst>
+          </p:cNvPr>
+          <p:cNvSpPr>
+            <a:spLocks noGrp="1"/>
+          </p:cNvSpPr>
+          <p:nvPr>
+            <p:ph type="title"/>
+          </p:nvPr>
+        </p:nvSpPr>
+        <p:spPr/>
+        <p:txBody>
+          <a:bodyPr/>
+          <a:lstStyle/>
+          <a:p>
+            <a:r>
+              <a:rPr lang="en-US" dirty="0"/>
+              <a:t>Example Prompt &amp; Text</a:t>
+            </a:r>
+          </a:p>
+        </p:txBody>
+      </p:sp>
+      <p:pic>
+        <p:nvPicPr>
+          <p:cNvPr id="5" name="Content Placeholder 4">
+            <a:extLst>
+              <a:ext uri="{FF2B5EF4-FFF2-40B4-BE49-F238E27FC236}">
+                <a16:creationId xmlns:a16="http://schemas.microsoft.com/office/drawing/2014/main" id="{163FC694-4D2D-9969-C436-6317E386D62B}"/>
+              </a:ext>
+            </a:extLst>
+          </p:cNvPr>
+          <p:cNvPicPr>
+            <a:picLocks noGrp="1" noChangeAspect="1"/>
+          </p:cNvPicPr>
+          <p:nvPr>
+            <p:ph idx="1"/>
+          </p:nvPr>
+        </p:nvPicPr>
+        <p:blipFill>
+          <a:blip r:embed="rId2"/>
+          <a:stretch>
+            <a:fillRect/>
+          </a:stretch>
+        </p:blipFill>
+        <p:spPr>
+          <a:xfrm>
+            <a:off x="3224213" y="2052979"/>
+            <a:ext cx="5743574" cy="4432801"/>
+          </a:xfrm>
+        </p:spPr>
+      </p:pic>
+    </p:spTree>
+    <p:extLst>
+      <p:ext uri="{BB962C8B-B14F-4D97-AF65-F5344CB8AC3E}">
+        <p14:creationId xmlns:p14="http://schemas.microsoft.com/office/powerpoint/2010/main" val="4083359967"/>
+      </p:ext>
+    </p:extLst>
+  </p:cSld>
+  <p:clrMapOvr>
+    <a:masterClrMapping/>
+  </p:clrMapOvr>
+</p:sld>
+</file>
+
+<file path=ppt/slides/slide4.xml><?xml version="1.0" encoding="utf-8"?>
+<p:sld xmlns:a="http://schemas.openxmlformats.org/drawingml/2006/main" xmlns:r="http://schemas.openxmlformats.org/officeDocument/2006/relationships" xmlns:p="http://schemas.openxmlformats.org/presentationml/2006/main">
+  <p:cSld>
+    <p:spTree>
+      <p:nvGrpSpPr>
+        <p:cNvPr id="1" name=""/>
+        <p:cNvGrpSpPr/>
+        <p:nvPr/>
+      </p:nvGrpSpPr>
+      <p:grpSpPr>
+        <a:xfrm>
+          <a:off x="0" y="0"/>
+          <a:ext cx="0" cy="0"/>
+          <a:chOff x="0" y="0"/>
+          <a:chExt cx="0" cy="0"/>
+        </a:xfrm>
+      </p:grpSpPr>
+      <p:sp>
+        <p:nvSpPr>
+          <p:cNvPr id="2" name="Title 1">
+            <a:extLst>
+              <a:ext uri="{FF2B5EF4-FFF2-40B4-BE49-F238E27FC236}">
                 <a16:creationId xmlns:a16="http://schemas.microsoft.com/office/drawing/2014/main" id="{CEBFFDA7-8D7A-CE3E-E493-7DB4245667BC}"/>
               </a:ext>
             </a:extLst>
@@ -14200,7 +14405,7 @@
           <a:p>
             <a:r>
               <a:rPr lang="en-US" dirty="0"/>
-              <a:t>Data and Data Prep process</a:t>
+              <a:t>Data and Data Prep Process</a:t>
             </a:r>
           </a:p>
         </p:txBody>
@@ -14281,7 +14486,7 @@
 </p:sld>
 </file>
 
-<file path=ppt/slides/slide4.xml><?xml version="1.0" encoding="utf-8"?>
+<file path=ppt/slides/slide5.xml><?xml version="1.0" encoding="utf-8"?>
 <p:sld xmlns:a="http://schemas.openxmlformats.org/drawingml/2006/main" xmlns:r="http://schemas.openxmlformats.org/officeDocument/2006/relationships" xmlns:p="http://schemas.openxmlformats.org/presentationml/2006/main">
   <p:cSld>
     <p:spTree>
@@ -14403,7 +14608,7 @@
 </p:sld>
 </file>
 
-<file path=ppt/slides/slide5.xml><?xml version="1.0" encoding="utf-8"?>
+<file path=ppt/slides/slide6.xml><?xml version="1.0" encoding="utf-8"?>
 <p:sld xmlns:a="http://schemas.openxmlformats.org/drawingml/2006/main" xmlns:r="http://schemas.openxmlformats.org/officeDocument/2006/relationships" xmlns:p="http://schemas.openxmlformats.org/presentationml/2006/main">
   <p:cSld>
     <p:spTree>
@@ -14553,7 +14758,7 @@
 </p:sld>
 </file>
 
-<file path=ppt/slides/slide6.xml><?xml version="1.0" encoding="utf-8"?>
+<file path=ppt/slides/slide7.xml><?xml version="1.0" encoding="utf-8"?>
 <p:sld xmlns:a="http://schemas.openxmlformats.org/drawingml/2006/main" xmlns:r="http://schemas.openxmlformats.org/officeDocument/2006/relationships" xmlns:p="http://schemas.openxmlformats.org/presentationml/2006/main">
   <p:cSld>
     <p:spTree>
@@ -14651,7 +14856,7 @@
 </p:sld>
 </file>
 
-<file path=ppt/slides/slide7.xml><?xml version="1.0" encoding="utf-8"?>
+<file path=ppt/slides/slide8.xml><?xml version="1.0" encoding="utf-8"?>
 <p:sld xmlns:a="http://schemas.openxmlformats.org/drawingml/2006/main" xmlns:r="http://schemas.openxmlformats.org/officeDocument/2006/relationships" xmlns:p="http://schemas.openxmlformats.org/presentationml/2006/main">
   <p:cSld>
     <p:spTree>
@@ -14778,7 +14983,7 @@
 </p:sld>
 </file>
 
-<file path=ppt/slides/slide8.xml><?xml version="1.0" encoding="utf-8"?>
+<file path=ppt/slides/slide9.xml><?xml version="1.0" encoding="utf-8"?>
 <p:sld xmlns:a="http://schemas.openxmlformats.org/drawingml/2006/main" xmlns:r="http://schemas.openxmlformats.org/officeDocument/2006/relationships" xmlns:p="http://schemas.openxmlformats.org/presentationml/2006/main">
   <p:cSld>
     <p:spTree>
@@ -14921,110 +15126,6 @@
     <p:extLst>
       <p:ext uri="{BB962C8B-B14F-4D97-AF65-F5344CB8AC3E}">
         <p14:creationId xmlns:p14="http://schemas.microsoft.com/office/powerpoint/2010/main" val="506510662"/>
-      </p:ext>
-    </p:extLst>
-  </p:cSld>
-  <p:clrMapOvr>
-    <a:masterClrMapping/>
-  </p:clrMapOvr>
-</p:sld>
-</file>
-
-<file path=ppt/slides/slide9.xml><?xml version="1.0" encoding="utf-8"?>
-<p:sld xmlns:a="http://schemas.openxmlformats.org/drawingml/2006/main" xmlns:r="http://schemas.openxmlformats.org/officeDocument/2006/relationships" xmlns:p="http://schemas.openxmlformats.org/presentationml/2006/main">
-  <p:cSld>
-    <p:spTree>
-      <p:nvGrpSpPr>
-        <p:cNvPr id="1" name=""/>
-        <p:cNvGrpSpPr/>
-        <p:nvPr/>
-      </p:nvGrpSpPr>
-      <p:grpSpPr>
-        <a:xfrm>
-          <a:off x="0" y="0"/>
-          <a:ext cx="0" cy="0"/>
-          <a:chOff x="0" y="0"/>
-          <a:chExt cx="0" cy="0"/>
-        </a:xfrm>
-      </p:grpSpPr>
-      <p:sp>
-        <p:nvSpPr>
-          <p:cNvPr id="2" name="Title 1">
-            <a:extLst>
-              <a:ext uri="{FF2B5EF4-FFF2-40B4-BE49-F238E27FC236}">
-                <a16:creationId xmlns:a16="http://schemas.microsoft.com/office/drawing/2014/main" id="{2D7460D1-0AC6-D5D6-4CA1-BFD25ED2AC61}"/>
-              </a:ext>
-            </a:extLst>
-          </p:cNvPr>
-          <p:cNvSpPr>
-            <a:spLocks noGrp="1"/>
-          </p:cNvSpPr>
-          <p:nvPr>
-            <p:ph type="title"/>
-          </p:nvPr>
-        </p:nvSpPr>
-        <p:spPr/>
-        <p:txBody>
-          <a:bodyPr/>
-          <a:lstStyle/>
-          <a:p>
-            <a:r>
-              <a:rPr lang="en-US" dirty="0"/>
-              <a:t>Insights and Conclusion</a:t>
-            </a:r>
-          </a:p>
-        </p:txBody>
-      </p:sp>
-      <p:sp>
-        <p:nvSpPr>
-          <p:cNvPr id="3" name="Content Placeholder 2">
-            <a:extLst>
-              <a:ext uri="{FF2B5EF4-FFF2-40B4-BE49-F238E27FC236}">
-                <a16:creationId xmlns:a16="http://schemas.microsoft.com/office/drawing/2014/main" id="{96EEA921-37BD-1493-0918-AF468B834E2B}"/>
-              </a:ext>
-            </a:extLst>
-          </p:cNvPr>
-          <p:cNvSpPr>
-            <a:spLocks noGrp="1"/>
-          </p:cNvSpPr>
-          <p:nvPr>
-            <p:ph idx="1"/>
-          </p:nvPr>
-        </p:nvSpPr>
-        <p:spPr/>
-        <p:txBody>
-          <a:bodyPr/>
-          <a:lstStyle/>
-          <a:p>
-            <a:r>
-              <a:rPr lang="en-US" dirty="0"/>
-              <a:t>ChatGPT has a positive view on the future of AI unless prompted to have a neutral or negative stance. </a:t>
-            </a:r>
-          </a:p>
-          <a:p>
-            <a:r>
-              <a:rPr lang="en-US" dirty="0"/>
-              <a:t>Only 1 word with a negative connotation was among the most relevant.</a:t>
-            </a:r>
-          </a:p>
-          <a:p>
-            <a:endParaRPr lang="en-US" dirty="0"/>
-          </a:p>
-          <a:p>
-            <a:r>
-              <a:rPr lang="en-US" dirty="0"/>
-              <a:t>ChatGPT addresses the ethics of AI, despite being one.</a:t>
-            </a:r>
-          </a:p>
-          <a:p>
-            <a:endParaRPr lang="en-US" dirty="0"/>
-          </a:p>
-        </p:txBody>
-      </p:sp>
-    </p:spTree>
-    <p:extLst>
-      <p:ext uri="{BB962C8B-B14F-4D97-AF65-F5344CB8AC3E}">
-        <p14:creationId xmlns:p14="http://schemas.microsoft.com/office/powerpoint/2010/main" val="693560995"/>
       </p:ext>
     </p:extLst>
   </p:cSld>

</xml_diff>